<commit_message>
add timelapse to results
</commit_message>
<xml_diff>
--- a/Automated Testing Refinement Proposal.pptx
+++ b/Automated Testing Refinement Proposal.pptx
@@ -5,15 +5,16 @@
     <p:sldMasterId id="2147483648" r:id="rId1"/>
   </p:sldMasterIdLst>
   <p:notesMasterIdLst>
-    <p:notesMasterId r:id="rId8"/>
+    <p:notesMasterId r:id="rId9"/>
   </p:notesMasterIdLst>
   <p:sldIdLst>
     <p:sldId id="256" r:id="rId2"/>
     <p:sldId id="260" r:id="rId3"/>
-    <p:sldId id="261" r:id="rId4"/>
-    <p:sldId id="257" r:id="rId5"/>
-    <p:sldId id="258" r:id="rId6"/>
-    <p:sldId id="259" r:id="rId7"/>
+    <p:sldId id="262" r:id="rId4"/>
+    <p:sldId id="261" r:id="rId5"/>
+    <p:sldId id="257" r:id="rId6"/>
+    <p:sldId id="258" r:id="rId7"/>
+    <p:sldId id="259" r:id="rId8"/>
   </p:sldIdLst>
   <p:sldSz cx="12192000" cy="6858000"/>
   <p:notesSz cx="6858000" cy="9144000"/>
@@ -202,7 +203,7 @@
           <a:p>
             <a:fld id="{6A82B806-40D1-4ECE-AC78-6987831D7146}" type="datetimeFigureOut">
               <a:rPr lang="en-US" smtClean="0"/>
-              <a:t>6/5/2025</a:t>
+              <a:t>6/6/2025</a:t>
             </a:fld>
             <a:endParaRPr lang="en-US"/>
           </a:p>
@@ -534,7 +535,7 @@
           <a:p>
             <a:fld id="{A0E9F198-3222-4179-AA1E-E221065A465D}" type="slidenum">
               <a:rPr lang="en-US" smtClean="0"/>
-              <a:t>4</a:t>
+              <a:t>5</a:t>
             </a:fld>
             <a:endParaRPr lang="en-US"/>
           </a:p>
@@ -700,7 +701,7 @@
           <a:p>
             <a:fld id="{D5D6D89E-CD24-4F75-A5BE-2159720B5314}" type="datetimeFigureOut">
               <a:rPr lang="en-US" smtClean="0"/>
-              <a:t>6/5/2025</a:t>
+              <a:t>6/6/2025</a:t>
             </a:fld>
             <a:endParaRPr lang="en-US"/>
           </a:p>
@@ -898,7 +899,7 @@
           <a:p>
             <a:fld id="{D5D6D89E-CD24-4F75-A5BE-2159720B5314}" type="datetimeFigureOut">
               <a:rPr lang="en-US" smtClean="0"/>
-              <a:t>6/5/2025</a:t>
+              <a:t>6/6/2025</a:t>
             </a:fld>
             <a:endParaRPr lang="en-US"/>
           </a:p>
@@ -1106,7 +1107,7 @@
           <a:p>
             <a:fld id="{D5D6D89E-CD24-4F75-A5BE-2159720B5314}" type="datetimeFigureOut">
               <a:rPr lang="en-US" smtClean="0"/>
-              <a:t>6/5/2025</a:t>
+              <a:t>6/6/2025</a:t>
             </a:fld>
             <a:endParaRPr lang="en-US"/>
           </a:p>
@@ -1304,7 +1305,7 @@
           <a:p>
             <a:fld id="{D5D6D89E-CD24-4F75-A5BE-2159720B5314}" type="datetimeFigureOut">
               <a:rPr lang="en-US" smtClean="0"/>
-              <a:t>6/5/2025</a:t>
+              <a:t>6/6/2025</a:t>
             </a:fld>
             <a:endParaRPr lang="en-US"/>
           </a:p>
@@ -1579,7 +1580,7 @@
           <a:p>
             <a:fld id="{D5D6D89E-CD24-4F75-A5BE-2159720B5314}" type="datetimeFigureOut">
               <a:rPr lang="en-US" smtClean="0"/>
-              <a:t>6/5/2025</a:t>
+              <a:t>6/6/2025</a:t>
             </a:fld>
             <a:endParaRPr lang="en-US"/>
           </a:p>
@@ -1844,7 +1845,7 @@
           <a:p>
             <a:fld id="{D5D6D89E-CD24-4F75-A5BE-2159720B5314}" type="datetimeFigureOut">
               <a:rPr lang="en-US" smtClean="0"/>
-              <a:t>6/5/2025</a:t>
+              <a:t>6/6/2025</a:t>
             </a:fld>
             <a:endParaRPr lang="en-US"/>
           </a:p>
@@ -2256,7 +2257,7 @@
           <a:p>
             <a:fld id="{D5D6D89E-CD24-4F75-A5BE-2159720B5314}" type="datetimeFigureOut">
               <a:rPr lang="en-US" smtClean="0"/>
-              <a:t>6/5/2025</a:t>
+              <a:t>6/6/2025</a:t>
             </a:fld>
             <a:endParaRPr lang="en-US"/>
           </a:p>
@@ -2397,7 +2398,7 @@
           <a:p>
             <a:fld id="{D5D6D89E-CD24-4F75-A5BE-2159720B5314}" type="datetimeFigureOut">
               <a:rPr lang="en-US" smtClean="0"/>
-              <a:t>6/5/2025</a:t>
+              <a:t>6/6/2025</a:t>
             </a:fld>
             <a:endParaRPr lang="en-US"/>
           </a:p>
@@ -2510,7 +2511,7 @@
           <a:p>
             <a:fld id="{D5D6D89E-CD24-4F75-A5BE-2159720B5314}" type="datetimeFigureOut">
               <a:rPr lang="en-US" smtClean="0"/>
-              <a:t>6/5/2025</a:t>
+              <a:t>6/6/2025</a:t>
             </a:fld>
             <a:endParaRPr lang="en-US"/>
           </a:p>
@@ -2821,7 +2822,7 @@
           <a:p>
             <a:fld id="{D5D6D89E-CD24-4F75-A5BE-2159720B5314}" type="datetimeFigureOut">
               <a:rPr lang="en-US" smtClean="0"/>
-              <a:t>6/5/2025</a:t>
+              <a:t>6/6/2025</a:t>
             </a:fld>
             <a:endParaRPr lang="en-US"/>
           </a:p>
@@ -3109,7 +3110,7 @@
           <a:p>
             <a:fld id="{D5D6D89E-CD24-4F75-A5BE-2159720B5314}" type="datetimeFigureOut">
               <a:rPr lang="en-US" smtClean="0"/>
-              <a:t>6/5/2025</a:t>
+              <a:t>6/6/2025</a:t>
             </a:fld>
             <a:endParaRPr lang="en-US"/>
           </a:p>
@@ -3350,7 +3351,7 @@
           <a:p>
             <a:fld id="{D5D6D89E-CD24-4F75-A5BE-2159720B5314}" type="datetimeFigureOut">
               <a:rPr lang="en-US" smtClean="0"/>
-              <a:t>6/5/2025</a:t>
+              <a:t>6/6/2025</a:t>
             </a:fld>
             <a:endParaRPr lang="en-US"/>
           </a:p>
@@ -4681,6 +4682,36 @@
           </a:prstGeom>
         </p:spPr>
       </p:pic>
+      <p:pic>
+        <p:nvPicPr>
+          <p:cNvPr id="3" name="Picture 2">
+            <a:extLst>
+              <a:ext uri="{FF2B5EF4-FFF2-40B4-BE49-F238E27FC236}">
+                <a16:creationId xmlns:a16="http://schemas.microsoft.com/office/drawing/2014/main" id="{CE478AD2-C4E7-BDB9-BB00-D72BEDE5D4F3}"/>
+              </a:ext>
+            </a:extLst>
+          </p:cNvPr>
+          <p:cNvPicPr>
+            <a:picLocks noChangeAspect="1"/>
+          </p:cNvPicPr>
+          <p:nvPr/>
+        </p:nvPicPr>
+        <p:blipFill>
+          <a:blip r:embed="rId4"/>
+          <a:stretch>
+            <a:fillRect/>
+          </a:stretch>
+        </p:blipFill>
+        <p:spPr>
+          <a:xfrm>
+            <a:off x="0" y="314412"/>
+            <a:ext cx="12192000" cy="6229175"/>
+          </a:xfrm>
+          <a:prstGeom prst="rect">
+            <a:avLst/>
+          </a:prstGeom>
+        </p:spPr>
+      </p:pic>
     </p:spTree>
     <p:extLst>
       <p:ext uri="{BB962C8B-B14F-4D97-AF65-F5344CB8AC3E}">
@@ -4707,7 +4738,13 @@
     </p:bg>
     <p:spTree>
       <p:nvGrpSpPr>
-        <p:cNvPr id="1" name=""/>
+        <p:cNvPr id="1" name="">
+          <a:extLst>
+            <a:ext uri="{FF2B5EF4-FFF2-40B4-BE49-F238E27FC236}">
+              <a16:creationId xmlns:a16="http://schemas.microsoft.com/office/drawing/2014/main" id="{FF193B27-5C31-9D79-FFA2-65BA156D529A}"/>
+            </a:ext>
+          </a:extLst>
+        </p:cNvPr>
         <p:cNvGrpSpPr/>
         <p:nvPr/>
       </p:nvGrpSpPr>
@@ -4721,10 +4758,10 @@
       </p:grpSpPr>
       <p:sp>
         <p:nvSpPr>
-          <p:cNvPr id="12" name="Rectangle 11">
-            <a:extLst>
-              <a:ext uri="{FF2B5EF4-FFF2-40B4-BE49-F238E27FC236}">
-                <a16:creationId xmlns:a16="http://schemas.microsoft.com/office/drawing/2014/main" id="{F3060C83-F051-4F0E-ABAD-AA0DFC48B218}"/>
+          <p:cNvPr id="23" name="Rectangle 22">
+            <a:extLst>
+              <a:ext uri="{FF2B5EF4-FFF2-40B4-BE49-F238E27FC236}">
+                <a16:creationId xmlns:a16="http://schemas.microsoft.com/office/drawing/2014/main" id="{BDCD886F-C40D-F6F4-08CF-B4C50B824BD5}"/>
               </a:ext>
               <a:ext uri="{C183D7F6-B498-43B3-948B-1728B52AA6E4}">
                 <adec:decorative xmlns:adec="http://schemas.microsoft.com/office/drawing/2017/decorative" val="1"/>
@@ -4784,10 +4821,10 @@
       </p:sp>
       <p:sp>
         <p:nvSpPr>
-          <p:cNvPr id="14" name="Freeform: Shape 13">
-            <a:extLst>
-              <a:ext uri="{FF2B5EF4-FFF2-40B4-BE49-F238E27FC236}">
-                <a16:creationId xmlns:a16="http://schemas.microsoft.com/office/drawing/2014/main" id="{83C98ABE-055B-441F-B07E-44F97F083C39}"/>
+          <p:cNvPr id="25" name="Freeform: Shape 24">
+            <a:extLst>
+              <a:ext uri="{FF2B5EF4-FFF2-40B4-BE49-F238E27FC236}">
+                <a16:creationId xmlns:a16="http://schemas.microsoft.com/office/drawing/2014/main" id="{E126D4B1-0E71-A7D7-BAC4-34042ADDDB7A}"/>
               </a:ext>
               <a:ext uri="{C183D7F6-B498-43B3-948B-1728B52AA6E4}">
                 <adec:decorative xmlns:adec="http://schemas.microsoft.com/office/drawing/2017/decorative" val="1"/>
@@ -4900,10 +4937,10 @@
       </p:sp>
       <p:sp>
         <p:nvSpPr>
-          <p:cNvPr id="16" name="Rectangle 15">
-            <a:extLst>
-              <a:ext uri="{FF2B5EF4-FFF2-40B4-BE49-F238E27FC236}">
-                <a16:creationId xmlns:a16="http://schemas.microsoft.com/office/drawing/2014/main" id="{29FDB030-9B49-4CED-8CCD-4D99382388AC}"/>
+          <p:cNvPr id="27" name="Rectangle 26">
+            <a:extLst>
+              <a:ext uri="{FF2B5EF4-FFF2-40B4-BE49-F238E27FC236}">
+                <a16:creationId xmlns:a16="http://schemas.microsoft.com/office/drawing/2014/main" id="{01C54730-040C-BCD7-C803-7E0192B237B8}"/>
               </a:ext>
               <a:ext uri="{C183D7F6-B498-43B3-948B-1728B52AA6E4}">
                 <adec:decorative xmlns:adec="http://schemas.microsoft.com/office/drawing/2017/decorative" val="1"/>
@@ -4965,10 +5002,10 @@
       </p:sp>
       <p:sp>
         <p:nvSpPr>
-          <p:cNvPr id="18" name="Rectangle 17">
-            <a:extLst>
-              <a:ext uri="{FF2B5EF4-FFF2-40B4-BE49-F238E27FC236}">
-                <a16:creationId xmlns:a16="http://schemas.microsoft.com/office/drawing/2014/main" id="{3783CA14-24A1-485C-8B30-D6A5D87987AD}"/>
+          <p:cNvPr id="29" name="Rectangle 28">
+            <a:extLst>
+              <a:ext uri="{FF2B5EF4-FFF2-40B4-BE49-F238E27FC236}">
+                <a16:creationId xmlns:a16="http://schemas.microsoft.com/office/drawing/2014/main" id="{C9C4230A-0C06-194F-2CE5-90AF0A09443F}"/>
               </a:ext>
               <a:ext uri="{C183D7F6-B498-43B3-948B-1728B52AA6E4}">
                 <adec:decorative xmlns:adec="http://schemas.microsoft.com/office/drawing/2017/decorative" val="1"/>
@@ -5030,10 +5067,10 @@
       </p:sp>
       <p:sp>
         <p:nvSpPr>
-          <p:cNvPr id="20" name="Freeform: Shape 19">
-            <a:extLst>
-              <a:ext uri="{FF2B5EF4-FFF2-40B4-BE49-F238E27FC236}">
-                <a16:creationId xmlns:a16="http://schemas.microsoft.com/office/drawing/2014/main" id="{9A97C86A-04D6-40F7-AE84-31AB43E6A846}"/>
+          <p:cNvPr id="31" name="Freeform: Shape 30">
+            <a:extLst>
+              <a:ext uri="{FF2B5EF4-FFF2-40B4-BE49-F238E27FC236}">
+                <a16:creationId xmlns:a16="http://schemas.microsoft.com/office/drawing/2014/main" id="{532ED023-0434-460E-0F42-7C927A657D3B}"/>
               </a:ext>
               <a:ext uri="{C183D7F6-B498-43B3-948B-1728B52AA6E4}">
                 <adec:decorative xmlns:adec="http://schemas.microsoft.com/office/drawing/2017/decorative" val="1"/>
@@ -5140,10 +5177,10 @@
       </p:sp>
       <p:sp>
         <p:nvSpPr>
-          <p:cNvPr id="22" name="Isosceles Triangle 21">
-            <a:extLst>
-              <a:ext uri="{FF2B5EF4-FFF2-40B4-BE49-F238E27FC236}">
-                <a16:creationId xmlns:a16="http://schemas.microsoft.com/office/drawing/2014/main" id="{FF9F2414-84E8-453E-B1F3-389FDE8192D9}"/>
+          <p:cNvPr id="33" name="Isosceles Triangle 32">
+            <a:extLst>
+              <a:ext uri="{FF2B5EF4-FFF2-40B4-BE49-F238E27FC236}">
+                <a16:creationId xmlns:a16="http://schemas.microsoft.com/office/drawing/2014/main" id="{C040AACC-481F-3946-E119-CE165D4F8C98}"/>
               </a:ext>
               <a:ext uri="{C183D7F6-B498-43B3-948B-1728B52AA6E4}">
                 <adec:decorative xmlns:adec="http://schemas.microsoft.com/office/drawing/2017/decorative" val="1"/>
@@ -5205,10 +5242,10 @@
       </p:sp>
       <p:pic>
         <p:nvPicPr>
-          <p:cNvPr id="7" name="Picture 6" descr="A diagram of a software development process&#10;&#10;AI-generated content may be incorrect.">
-            <a:extLst>
-              <a:ext uri="{FF2B5EF4-FFF2-40B4-BE49-F238E27FC236}">
-                <a16:creationId xmlns:a16="http://schemas.microsoft.com/office/drawing/2014/main" id="{3821F8EB-DF55-9893-1471-2BA85C63BB0D}"/>
+          <p:cNvPr id="7" name="Picture 6">
+            <a:extLst>
+              <a:ext uri="{FF2B5EF4-FFF2-40B4-BE49-F238E27FC236}">
+                <a16:creationId xmlns:a16="http://schemas.microsoft.com/office/drawing/2014/main" id="{64D7054A-E80C-4C6A-AFCE-FDF31CBE32A4}"/>
               </a:ext>
             </a:extLst>
           </p:cNvPr>
@@ -5219,14 +5256,15 @@
         </p:nvPicPr>
         <p:blipFill>
           <a:blip r:embed="rId2"/>
+          <a:srcRect l="359" r="1" b="1"/>
           <a:stretch>
             <a:fillRect/>
           </a:stretch>
         </p:blipFill>
         <p:spPr>
           <a:xfrm>
-            <a:off x="4236657" y="643467"/>
-            <a:ext cx="3718685" cy="5571065"/>
+            <a:off x="653780" y="643467"/>
+            <a:ext cx="10884439" cy="5571065"/>
           </a:xfrm>
           <a:prstGeom prst="rect">
             <a:avLst/>
@@ -5238,10 +5276,10 @@
       </p:pic>
       <p:sp>
         <p:nvSpPr>
-          <p:cNvPr id="24" name="Isosceles Triangle 23">
-            <a:extLst>
-              <a:ext uri="{FF2B5EF4-FFF2-40B4-BE49-F238E27FC236}">
-                <a16:creationId xmlns:a16="http://schemas.microsoft.com/office/drawing/2014/main" id="{3ECA69A1-7536-43AC-85EF-C7106179F5ED}"/>
+          <p:cNvPr id="35" name="Isosceles Triangle 34">
+            <a:extLst>
+              <a:ext uri="{FF2B5EF4-FFF2-40B4-BE49-F238E27FC236}">
+                <a16:creationId xmlns:a16="http://schemas.microsoft.com/office/drawing/2014/main" id="{F3407A21-8FA9-CDDA-D098-4419EBDF06A8}"/>
               </a:ext>
               <a:ext uri="{C183D7F6-B498-43B3-948B-1728B52AA6E4}">
                 <adec:decorative xmlns:adec="http://schemas.microsoft.com/office/drawing/2017/decorative" val="1"/>
@@ -5301,10 +5339,130 @@
           </a:p>
         </p:txBody>
       </p:sp>
+      <p:pic>
+        <p:nvPicPr>
+          <p:cNvPr id="9" name="Picture 8">
+            <a:extLst>
+              <a:ext uri="{FF2B5EF4-FFF2-40B4-BE49-F238E27FC236}">
+                <a16:creationId xmlns:a16="http://schemas.microsoft.com/office/drawing/2014/main" id="{854D5D9F-9984-F07D-D928-E20C3C2804F3}"/>
+              </a:ext>
+            </a:extLst>
+          </p:cNvPr>
+          <p:cNvPicPr>
+            <a:picLocks noChangeAspect="1"/>
+          </p:cNvPicPr>
+          <p:nvPr/>
+        </p:nvPicPr>
+        <p:blipFill>
+          <a:blip r:embed="rId2"/>
+          <a:stretch>
+            <a:fillRect/>
+          </a:stretch>
+        </p:blipFill>
+        <p:spPr>
+          <a:xfrm>
+            <a:off x="0" y="321568"/>
+            <a:ext cx="12192000" cy="6214864"/>
+          </a:xfrm>
+          <a:prstGeom prst="rect">
+            <a:avLst/>
+          </a:prstGeom>
+        </p:spPr>
+      </p:pic>
+      <p:pic>
+        <p:nvPicPr>
+          <p:cNvPr id="11" name="Picture 10">
+            <a:extLst>
+              <a:ext uri="{FF2B5EF4-FFF2-40B4-BE49-F238E27FC236}">
+                <a16:creationId xmlns:a16="http://schemas.microsoft.com/office/drawing/2014/main" id="{40EE43A0-814C-291A-E8B9-64CCDD3F1AD4}"/>
+              </a:ext>
+            </a:extLst>
+          </p:cNvPr>
+          <p:cNvPicPr>
+            <a:picLocks noChangeAspect="1"/>
+          </p:cNvPicPr>
+          <p:nvPr/>
+        </p:nvPicPr>
+        <p:blipFill>
+          <a:blip r:embed="rId3"/>
+          <a:stretch>
+            <a:fillRect/>
+          </a:stretch>
+        </p:blipFill>
+        <p:spPr>
+          <a:xfrm>
+            <a:off x="0" y="353193"/>
+            <a:ext cx="12192000" cy="6151613"/>
+          </a:xfrm>
+          <a:prstGeom prst="rect">
+            <a:avLst/>
+          </a:prstGeom>
+        </p:spPr>
+      </p:pic>
+      <p:pic>
+        <p:nvPicPr>
+          <p:cNvPr id="3" name="Picture 2">
+            <a:extLst>
+              <a:ext uri="{FF2B5EF4-FFF2-40B4-BE49-F238E27FC236}">
+                <a16:creationId xmlns:a16="http://schemas.microsoft.com/office/drawing/2014/main" id="{E34D026F-C9C4-BCFD-DAC7-2746FB6F5586}"/>
+              </a:ext>
+            </a:extLst>
+          </p:cNvPr>
+          <p:cNvPicPr>
+            <a:picLocks noChangeAspect="1"/>
+          </p:cNvPicPr>
+          <p:nvPr/>
+        </p:nvPicPr>
+        <p:blipFill>
+          <a:blip r:embed="rId4"/>
+          <a:stretch>
+            <a:fillRect/>
+          </a:stretch>
+        </p:blipFill>
+        <p:spPr>
+          <a:xfrm>
+            <a:off x="0" y="314412"/>
+            <a:ext cx="12192000" cy="6229175"/>
+          </a:xfrm>
+          <a:prstGeom prst="rect">
+            <a:avLst/>
+          </a:prstGeom>
+        </p:spPr>
+      </p:pic>
+      <p:pic>
+        <p:nvPicPr>
+          <p:cNvPr id="4" name="Picture 3">
+            <a:extLst>
+              <a:ext uri="{FF2B5EF4-FFF2-40B4-BE49-F238E27FC236}">
+                <a16:creationId xmlns:a16="http://schemas.microsoft.com/office/drawing/2014/main" id="{A442B7F3-B9B3-6F15-87AC-D931E79520FC}"/>
+              </a:ext>
+            </a:extLst>
+          </p:cNvPr>
+          <p:cNvPicPr>
+            <a:picLocks noChangeAspect="1"/>
+          </p:cNvPicPr>
+          <p:nvPr/>
+        </p:nvPicPr>
+        <p:blipFill>
+          <a:blip r:embed="rId5"/>
+          <a:stretch>
+            <a:fillRect/>
+          </a:stretch>
+        </p:blipFill>
+        <p:spPr>
+          <a:xfrm>
+            <a:off x="0" y="303726"/>
+            <a:ext cx="12192000" cy="6250547"/>
+          </a:xfrm>
+          <a:prstGeom prst="rect">
+            <a:avLst/>
+          </a:prstGeom>
+        </p:spPr>
+      </p:pic>
     </p:spTree>
     <p:extLst>
       <p:ext uri="{BB962C8B-B14F-4D97-AF65-F5344CB8AC3E}">
-        <p14:creationId xmlns:p14="http://schemas.microsoft.com/office/powerpoint/2010/main" val="2064725996"/>
+        <p14:creationId xmlns:p14="http://schemas.microsoft.com/office/powerpoint/2010/main" val="3009936754"/>
       </p:ext>
     </p:extLst>
   </p:cSld>
@@ -5341,7 +5499,7 @@
       </p:grpSpPr>
       <p:sp>
         <p:nvSpPr>
-          <p:cNvPr id="21" name="Rectangle 20">
+          <p:cNvPr id="12" name="Rectangle 11">
             <a:extLst>
               <a:ext uri="{FF2B5EF4-FFF2-40B4-BE49-F238E27FC236}">
                 <a16:creationId xmlns:a16="http://schemas.microsoft.com/office/drawing/2014/main" id="{F3060C83-F051-4F0E-ABAD-AA0DFC48B218}"/>
@@ -5404,7 +5562,7 @@
       </p:sp>
       <p:sp>
         <p:nvSpPr>
-          <p:cNvPr id="23" name="Freeform: Shape 22">
+          <p:cNvPr id="14" name="Freeform: Shape 13">
             <a:extLst>
               <a:ext uri="{FF2B5EF4-FFF2-40B4-BE49-F238E27FC236}">
                 <a16:creationId xmlns:a16="http://schemas.microsoft.com/office/drawing/2014/main" id="{83C98ABE-055B-441F-B07E-44F97F083C39}"/>
@@ -5520,7 +5678,7 @@
       </p:sp>
       <p:sp>
         <p:nvSpPr>
-          <p:cNvPr id="25" name="Rectangle 24">
+          <p:cNvPr id="16" name="Rectangle 15">
             <a:extLst>
               <a:ext uri="{FF2B5EF4-FFF2-40B4-BE49-F238E27FC236}">
                 <a16:creationId xmlns:a16="http://schemas.microsoft.com/office/drawing/2014/main" id="{29FDB030-9B49-4CED-8CCD-4D99382388AC}"/>
@@ -5585,7 +5743,7 @@
       </p:sp>
       <p:sp>
         <p:nvSpPr>
-          <p:cNvPr id="27" name="Rectangle 26">
+          <p:cNvPr id="18" name="Rectangle 17">
             <a:extLst>
               <a:ext uri="{FF2B5EF4-FFF2-40B4-BE49-F238E27FC236}">
                 <a16:creationId xmlns:a16="http://schemas.microsoft.com/office/drawing/2014/main" id="{3783CA14-24A1-485C-8B30-D6A5D87987AD}"/>
@@ -5650,7 +5808,7 @@
       </p:sp>
       <p:sp>
         <p:nvSpPr>
-          <p:cNvPr id="29" name="Freeform: Shape 28">
+          <p:cNvPr id="20" name="Freeform: Shape 19">
             <a:extLst>
               <a:ext uri="{FF2B5EF4-FFF2-40B4-BE49-F238E27FC236}">
                 <a16:creationId xmlns:a16="http://schemas.microsoft.com/office/drawing/2014/main" id="{9A97C86A-04D6-40F7-AE84-31AB43E6A846}"/>
@@ -5760,7 +5918,7 @@
       </p:sp>
       <p:sp>
         <p:nvSpPr>
-          <p:cNvPr id="31" name="Isosceles Triangle 30">
+          <p:cNvPr id="22" name="Isosceles Triangle 21">
             <a:extLst>
               <a:ext uri="{FF2B5EF4-FFF2-40B4-BE49-F238E27FC236}">
                 <a16:creationId xmlns:a16="http://schemas.microsoft.com/office/drawing/2014/main" id="{FF9F2414-84E8-453E-B1F3-389FDE8192D9}"/>
@@ -5825,37 +5983,28 @@
       </p:sp>
       <p:pic>
         <p:nvPicPr>
-          <p:cNvPr id="5" name="Content Placeholder 4" descr="A blue and white table with text&#10;&#10;AI-generated content may be incorrect.">
-            <a:extLst>
-              <a:ext uri="{FF2B5EF4-FFF2-40B4-BE49-F238E27FC236}">
-                <a16:creationId xmlns:a16="http://schemas.microsoft.com/office/drawing/2014/main" id="{985FD7B5-30CF-EE6D-592D-E17BE6D3D869}"/>
+          <p:cNvPr id="7" name="Picture 6" descr="A diagram of a software development process&#10;&#10;AI-generated content may be incorrect.">
+            <a:extLst>
+              <a:ext uri="{FF2B5EF4-FFF2-40B4-BE49-F238E27FC236}">
+                <a16:creationId xmlns:a16="http://schemas.microsoft.com/office/drawing/2014/main" id="{3821F8EB-DF55-9893-1471-2BA85C63BB0D}"/>
               </a:ext>
             </a:extLst>
           </p:cNvPr>
           <p:cNvPicPr>
-            <a:picLocks noGrp="1" noChangeAspect="1"/>
+            <a:picLocks noChangeAspect="1"/>
           </p:cNvPicPr>
-          <p:nvPr>
-            <p:ph idx="1"/>
-          </p:nvPr>
+          <p:nvPr/>
         </p:nvPicPr>
         <p:blipFill>
-          <a:blip r:embed="rId3">
-            <a:extLst>
-              <a:ext uri="{28A0092B-C50C-407E-A947-70E740481C1C}">
-                <a14:useLocalDpi xmlns:a14="http://schemas.microsoft.com/office/drawing/2010/main" val="0"/>
-              </a:ext>
-            </a:extLst>
-          </a:blip>
-          <a:srcRect b="12879"/>
+          <a:blip r:embed="rId2"/>
           <a:stretch>
             <a:fillRect/>
           </a:stretch>
         </p:blipFill>
         <p:spPr>
           <a:xfrm>
-            <a:off x="653759" y="643467"/>
-            <a:ext cx="10884481" cy="5571065"/>
+            <a:off x="4236657" y="643467"/>
+            <a:ext cx="3718685" cy="5571065"/>
           </a:xfrm>
           <a:prstGeom prst="rect">
             <a:avLst/>
@@ -5867,7 +6016,7 @@
       </p:pic>
       <p:sp>
         <p:nvSpPr>
-          <p:cNvPr id="33" name="Isosceles Triangle 32">
+          <p:cNvPr id="24" name="Isosceles Triangle 23">
             <a:extLst>
               <a:ext uri="{FF2B5EF4-FFF2-40B4-BE49-F238E27FC236}">
                 <a16:creationId xmlns:a16="http://schemas.microsoft.com/office/drawing/2014/main" id="{3ECA69A1-7536-43AC-85EF-C7106179F5ED}"/>
@@ -5933,7 +6082,7 @@
     </p:spTree>
     <p:extLst>
       <p:ext uri="{BB962C8B-B14F-4D97-AF65-F5344CB8AC3E}">
-        <p14:creationId xmlns:p14="http://schemas.microsoft.com/office/powerpoint/2010/main" val="1703398727"/>
+        <p14:creationId xmlns:p14="http://schemas.microsoft.com/office/powerpoint/2010/main" val="2064725996"/>
       </p:ext>
     </p:extLst>
   </p:cSld>
@@ -5970,7 +6119,7 @@
       </p:grpSpPr>
       <p:sp>
         <p:nvSpPr>
-          <p:cNvPr id="10" name="Rectangle 9">
+          <p:cNvPr id="21" name="Rectangle 20">
             <a:extLst>
               <a:ext uri="{FF2B5EF4-FFF2-40B4-BE49-F238E27FC236}">
                 <a16:creationId xmlns:a16="http://schemas.microsoft.com/office/drawing/2014/main" id="{F3060C83-F051-4F0E-ABAD-AA0DFC48B218}"/>
@@ -6033,7 +6182,7 @@
       </p:sp>
       <p:sp>
         <p:nvSpPr>
-          <p:cNvPr id="12" name="Freeform: Shape 11">
+          <p:cNvPr id="23" name="Freeform: Shape 22">
             <a:extLst>
               <a:ext uri="{FF2B5EF4-FFF2-40B4-BE49-F238E27FC236}">
                 <a16:creationId xmlns:a16="http://schemas.microsoft.com/office/drawing/2014/main" id="{83C98ABE-055B-441F-B07E-44F97F083C39}"/>
@@ -6149,7 +6298,7 @@
       </p:sp>
       <p:sp>
         <p:nvSpPr>
-          <p:cNvPr id="14" name="Rectangle 13">
+          <p:cNvPr id="25" name="Rectangle 24">
             <a:extLst>
               <a:ext uri="{FF2B5EF4-FFF2-40B4-BE49-F238E27FC236}">
                 <a16:creationId xmlns:a16="http://schemas.microsoft.com/office/drawing/2014/main" id="{29FDB030-9B49-4CED-8CCD-4D99382388AC}"/>
@@ -6214,7 +6363,7 @@
       </p:sp>
       <p:sp>
         <p:nvSpPr>
-          <p:cNvPr id="16" name="Rectangle 15">
+          <p:cNvPr id="27" name="Rectangle 26">
             <a:extLst>
               <a:ext uri="{FF2B5EF4-FFF2-40B4-BE49-F238E27FC236}">
                 <a16:creationId xmlns:a16="http://schemas.microsoft.com/office/drawing/2014/main" id="{3783CA14-24A1-485C-8B30-D6A5D87987AD}"/>
@@ -6279,7 +6428,7 @@
       </p:sp>
       <p:sp>
         <p:nvSpPr>
-          <p:cNvPr id="18" name="Freeform: Shape 17">
+          <p:cNvPr id="29" name="Freeform: Shape 28">
             <a:extLst>
               <a:ext uri="{FF2B5EF4-FFF2-40B4-BE49-F238E27FC236}">
                 <a16:creationId xmlns:a16="http://schemas.microsoft.com/office/drawing/2014/main" id="{9A97C86A-04D6-40F7-AE84-31AB43E6A846}"/>
@@ -6389,7 +6538,7 @@
       </p:sp>
       <p:sp>
         <p:nvSpPr>
-          <p:cNvPr id="20" name="Isosceles Triangle 19">
+          <p:cNvPr id="31" name="Isosceles Triangle 30">
             <a:extLst>
               <a:ext uri="{FF2B5EF4-FFF2-40B4-BE49-F238E27FC236}">
                 <a16:creationId xmlns:a16="http://schemas.microsoft.com/office/drawing/2014/main" id="{FF9F2414-84E8-453E-B1F3-389FDE8192D9}"/>
@@ -6454,28 +6603,37 @@
       </p:sp>
       <p:pic>
         <p:nvPicPr>
-          <p:cNvPr id="5" name="Picture 4">
-            <a:extLst>
-              <a:ext uri="{FF2B5EF4-FFF2-40B4-BE49-F238E27FC236}">
-                <a16:creationId xmlns:a16="http://schemas.microsoft.com/office/drawing/2014/main" id="{213B6238-D538-EB4C-89D7-3AAD5FB79508}"/>
+          <p:cNvPr id="5" name="Content Placeholder 4" descr="A blue and white table with text&#10;&#10;AI-generated content may be incorrect.">
+            <a:extLst>
+              <a:ext uri="{FF2B5EF4-FFF2-40B4-BE49-F238E27FC236}">
+                <a16:creationId xmlns:a16="http://schemas.microsoft.com/office/drawing/2014/main" id="{985FD7B5-30CF-EE6D-592D-E17BE6D3D869}"/>
               </a:ext>
             </a:extLst>
           </p:cNvPr>
           <p:cNvPicPr>
-            <a:picLocks noChangeAspect="1"/>
+            <a:picLocks noGrp="1" noChangeAspect="1"/>
           </p:cNvPicPr>
-          <p:nvPr/>
+          <p:nvPr>
+            <p:ph idx="1"/>
+          </p:nvPr>
         </p:nvPicPr>
         <p:blipFill>
-          <a:blip r:embed="rId2"/>
+          <a:blip r:embed="rId3">
+            <a:extLst>
+              <a:ext uri="{28A0092B-C50C-407E-A947-70E740481C1C}">
+                <a14:useLocalDpi xmlns:a14="http://schemas.microsoft.com/office/drawing/2010/main" val="0"/>
+              </a:ext>
+            </a:extLst>
+          </a:blip>
+          <a:srcRect b="12879"/>
           <a:stretch>
             <a:fillRect/>
           </a:stretch>
         </p:blipFill>
         <p:spPr>
           <a:xfrm>
-            <a:off x="643467" y="839045"/>
-            <a:ext cx="10905066" cy="5179908"/>
+            <a:off x="653759" y="643467"/>
+            <a:ext cx="10884481" cy="5571065"/>
           </a:xfrm>
           <a:prstGeom prst="rect">
             <a:avLst/>
@@ -6487,7 +6645,7 @@
       </p:pic>
       <p:sp>
         <p:nvSpPr>
-          <p:cNvPr id="22" name="Isosceles Triangle 21">
+          <p:cNvPr id="33" name="Isosceles Triangle 32">
             <a:extLst>
               <a:ext uri="{FF2B5EF4-FFF2-40B4-BE49-F238E27FC236}">
                 <a16:creationId xmlns:a16="http://schemas.microsoft.com/office/drawing/2014/main" id="{3ECA69A1-7536-43AC-85EF-C7106179F5ED}"/>
@@ -6553,6 +6711,626 @@
     </p:spTree>
     <p:extLst>
       <p:ext uri="{BB962C8B-B14F-4D97-AF65-F5344CB8AC3E}">
+        <p14:creationId xmlns:p14="http://schemas.microsoft.com/office/powerpoint/2010/main" val="1703398727"/>
+      </p:ext>
+    </p:extLst>
+  </p:cSld>
+  <p:clrMapOvr>
+    <a:masterClrMapping/>
+  </p:clrMapOvr>
+</p:sld>
+</file>
+
+<file path=ppt/slides/slide6.xml><?xml version="1.0" encoding="utf-8"?>
+<p:sld xmlns:a="http://schemas.openxmlformats.org/drawingml/2006/main" xmlns:r="http://schemas.openxmlformats.org/officeDocument/2006/relationships" xmlns:p="http://schemas.openxmlformats.org/presentationml/2006/main">
+  <p:cSld>
+    <p:bg>
+      <p:bgPr>
+        <a:solidFill>
+          <a:schemeClr val="bg1"/>
+        </a:solidFill>
+        <a:effectLst/>
+      </p:bgPr>
+    </p:bg>
+    <p:spTree>
+      <p:nvGrpSpPr>
+        <p:cNvPr id="1" name=""/>
+        <p:cNvGrpSpPr/>
+        <p:nvPr/>
+      </p:nvGrpSpPr>
+      <p:grpSpPr>
+        <a:xfrm>
+          <a:off x="0" y="0"/>
+          <a:ext cx="0" cy="0"/>
+          <a:chOff x="0" y="0"/>
+          <a:chExt cx="0" cy="0"/>
+        </a:xfrm>
+      </p:grpSpPr>
+      <p:sp>
+        <p:nvSpPr>
+          <p:cNvPr id="10" name="Rectangle 9">
+            <a:extLst>
+              <a:ext uri="{FF2B5EF4-FFF2-40B4-BE49-F238E27FC236}">
+                <a16:creationId xmlns:a16="http://schemas.microsoft.com/office/drawing/2014/main" id="{F3060C83-F051-4F0E-ABAD-AA0DFC48B218}"/>
+              </a:ext>
+              <a:ext uri="{C183D7F6-B498-43B3-948B-1728B52AA6E4}">
+                <adec:decorative xmlns:adec="http://schemas.microsoft.com/office/drawing/2017/decorative" val="1"/>
+              </a:ext>
+            </a:extLst>
+          </p:cNvPr>
+          <p:cNvSpPr>
+            <a:spLocks noGrp="1" noRot="1" noChangeAspect="1" noMove="1" noResize="1" noEditPoints="1" noAdjustHandles="1" noChangeArrowheads="1" noChangeShapeType="1" noTextEdit="1"/>
+          </p:cNvSpPr>
+          <p:nvPr>
+            <p:extLst>
+              <p:ext uri="{386F3935-93C4-4BCD-93E2-E3B085C9AB24}">
+                <p16:designElem xmlns:p16="http://schemas.microsoft.com/office/powerpoint/2015/main" val="1"/>
+              </p:ext>
+            </p:extLst>
+          </p:nvPr>
+        </p:nvSpPr>
+        <p:spPr>
+          <a:xfrm>
+            <a:off x="0" y="0"/>
+            <a:ext cx="12192000" cy="6858000"/>
+          </a:xfrm>
+          <a:prstGeom prst="rect">
+            <a:avLst/>
+          </a:prstGeom>
+          <a:solidFill>
+            <a:schemeClr val="bg1"/>
+          </a:solidFill>
+          <a:ln>
+            <a:noFill/>
+          </a:ln>
+        </p:spPr>
+        <p:style>
+          <a:lnRef idx="2">
+            <a:schemeClr val="accent1">
+              <a:shade val="50000"/>
+            </a:schemeClr>
+          </a:lnRef>
+          <a:fillRef idx="1">
+            <a:schemeClr val="accent1"/>
+          </a:fillRef>
+          <a:effectRef idx="0">
+            <a:schemeClr val="accent1"/>
+          </a:effectRef>
+          <a:fontRef idx="minor">
+            <a:schemeClr val="lt1"/>
+          </a:fontRef>
+        </p:style>
+        <p:txBody>
+          <a:bodyPr rtlCol="0" anchor="ctr"/>
+          <a:lstStyle/>
+          <a:p>
+            <a:pPr algn="ctr"/>
+            <a:endParaRPr lang="en-US" dirty="0"/>
+          </a:p>
+        </p:txBody>
+      </p:sp>
+      <p:sp>
+        <p:nvSpPr>
+          <p:cNvPr id="12" name="Freeform: Shape 11">
+            <a:extLst>
+              <a:ext uri="{FF2B5EF4-FFF2-40B4-BE49-F238E27FC236}">
+                <a16:creationId xmlns:a16="http://schemas.microsoft.com/office/drawing/2014/main" id="{83C98ABE-055B-441F-B07E-44F97F083C39}"/>
+              </a:ext>
+              <a:ext uri="{C183D7F6-B498-43B3-948B-1728B52AA6E4}">
+                <adec:decorative xmlns:adec="http://schemas.microsoft.com/office/drawing/2017/decorative" val="1"/>
+              </a:ext>
+            </a:extLst>
+          </p:cNvPr>
+          <p:cNvSpPr>
+            <a:spLocks noGrp="1" noRot="1" noChangeAspect="1" noMove="1" noResize="1" noEditPoints="1" noAdjustHandles="1" noChangeArrowheads="1" noChangeShapeType="1" noTextEdit="1"/>
+          </p:cNvSpPr>
+          <p:nvPr>
+            <p:extLst>
+              <p:ext uri="{386F3935-93C4-4BCD-93E2-E3B085C9AB24}">
+                <p16:designElem xmlns:p16="http://schemas.microsoft.com/office/powerpoint/2015/main" val="1"/>
+              </p:ext>
+            </p:extLst>
+          </p:nvPr>
+        </p:nvSpPr>
+        <p:spPr>
+          <a:xfrm rot="18900000" flipH="1">
+            <a:off x="-376156" y="-253670"/>
+            <a:ext cx="1827638" cy="1376989"/>
+          </a:xfrm>
+          <a:custGeom>
+            <a:avLst/>
+            <a:gdLst>
+              <a:gd name="connsiteX0" fmla="*/ 0 w 1827638"/>
+              <a:gd name="connsiteY0" fmla="*/ 987379 h 1376989"/>
+              <a:gd name="connsiteX1" fmla="*/ 987379 w 1827638"/>
+              <a:gd name="connsiteY1" fmla="*/ 0 h 1376989"/>
+              <a:gd name="connsiteX2" fmla="*/ 1827638 w 1827638"/>
+              <a:gd name="connsiteY2" fmla="*/ 840260 h 1376989"/>
+              <a:gd name="connsiteX3" fmla="*/ 1827638 w 1827638"/>
+              <a:gd name="connsiteY3" fmla="*/ 1376989 h 1376989"/>
+              <a:gd name="connsiteX4" fmla="*/ 0 w 1827638"/>
+              <a:gd name="connsiteY4" fmla="*/ 1376989 h 1376989"/>
+            </a:gdLst>
+            <a:ahLst/>
+            <a:cxnLst>
+              <a:cxn ang="0">
+                <a:pos x="connsiteX0" y="connsiteY0"/>
+              </a:cxn>
+              <a:cxn ang="0">
+                <a:pos x="connsiteX1" y="connsiteY1"/>
+              </a:cxn>
+              <a:cxn ang="0">
+                <a:pos x="connsiteX2" y="connsiteY2"/>
+              </a:cxn>
+              <a:cxn ang="0">
+                <a:pos x="connsiteX3" y="connsiteY3"/>
+              </a:cxn>
+              <a:cxn ang="0">
+                <a:pos x="connsiteX4" y="connsiteY4"/>
+              </a:cxn>
+            </a:cxnLst>
+            <a:rect l="l" t="t" r="r" b="b"/>
+            <a:pathLst>
+              <a:path w="1827638" h="1376989">
+                <a:moveTo>
+                  <a:pt x="0" y="987379"/>
+                </a:moveTo>
+                <a:lnTo>
+                  <a:pt x="987379" y="0"/>
+                </a:lnTo>
+                <a:lnTo>
+                  <a:pt x="1827638" y="840260"/>
+                </a:lnTo>
+                <a:lnTo>
+                  <a:pt x="1827638" y="1376989"/>
+                </a:lnTo>
+                <a:lnTo>
+                  <a:pt x="0" y="1376989"/>
+                </a:lnTo>
+                <a:close/>
+              </a:path>
+            </a:pathLst>
+          </a:custGeom>
+          <a:solidFill>
+            <a:schemeClr val="accent1">
+              <a:alpha val="30000"/>
+            </a:schemeClr>
+          </a:solidFill>
+          <a:ln>
+            <a:noFill/>
+          </a:ln>
+        </p:spPr>
+        <p:style>
+          <a:lnRef idx="2">
+            <a:schemeClr val="accent1">
+              <a:shade val="50000"/>
+            </a:schemeClr>
+          </a:lnRef>
+          <a:fillRef idx="1">
+            <a:schemeClr val="accent1"/>
+          </a:fillRef>
+          <a:effectRef idx="0">
+            <a:schemeClr val="accent1"/>
+          </a:effectRef>
+          <a:fontRef idx="minor">
+            <a:schemeClr val="lt1"/>
+          </a:fontRef>
+        </p:style>
+        <p:txBody>
+          <a:bodyPr rtlCol="0" anchor="ctr"/>
+          <a:lstStyle/>
+          <a:p>
+            <a:pPr algn="ctr"/>
+            <a:endParaRPr lang="en-US" dirty="0"/>
+          </a:p>
+        </p:txBody>
+      </p:sp>
+      <p:sp>
+        <p:nvSpPr>
+          <p:cNvPr id="14" name="Rectangle 13">
+            <a:extLst>
+              <a:ext uri="{FF2B5EF4-FFF2-40B4-BE49-F238E27FC236}">
+                <a16:creationId xmlns:a16="http://schemas.microsoft.com/office/drawing/2014/main" id="{29FDB030-9B49-4CED-8CCD-4D99382388AC}"/>
+              </a:ext>
+              <a:ext uri="{C183D7F6-B498-43B3-948B-1728B52AA6E4}">
+                <adec:decorative xmlns:adec="http://schemas.microsoft.com/office/drawing/2017/decorative" val="1"/>
+              </a:ext>
+            </a:extLst>
+          </p:cNvPr>
+          <p:cNvSpPr>
+            <a:spLocks noGrp="1" noRot="1" noChangeAspect="1" noMove="1" noResize="1" noEditPoints="1" noAdjustHandles="1" noChangeArrowheads="1" noChangeShapeType="1" noTextEdit="1"/>
+          </p:cNvSpPr>
+          <p:nvPr>
+            <p:extLst>
+              <p:ext uri="{386F3935-93C4-4BCD-93E2-E3B085C9AB24}">
+                <p16:designElem xmlns:p16="http://schemas.microsoft.com/office/powerpoint/2015/main" val="1"/>
+              </p:ext>
+            </p:extLst>
+          </p:nvPr>
+        </p:nvSpPr>
+        <p:spPr>
+          <a:xfrm rot="18900000" flipH="1">
+            <a:off x="891641" y="422146"/>
+            <a:ext cx="645368" cy="645368"/>
+          </a:xfrm>
+          <a:prstGeom prst="rect">
+            <a:avLst/>
+          </a:prstGeom>
+          <a:solidFill>
+            <a:schemeClr val="accent1">
+              <a:alpha val="30000"/>
+            </a:schemeClr>
+          </a:solidFill>
+          <a:ln>
+            <a:noFill/>
+          </a:ln>
+        </p:spPr>
+        <p:style>
+          <a:lnRef idx="2">
+            <a:schemeClr val="accent1">
+              <a:shade val="50000"/>
+            </a:schemeClr>
+          </a:lnRef>
+          <a:fillRef idx="1">
+            <a:schemeClr val="accent1"/>
+          </a:fillRef>
+          <a:effectRef idx="0">
+            <a:schemeClr val="accent1"/>
+          </a:effectRef>
+          <a:fontRef idx="minor">
+            <a:schemeClr val="lt1"/>
+          </a:fontRef>
+        </p:style>
+        <p:txBody>
+          <a:bodyPr rtlCol="0" anchor="ctr"/>
+          <a:lstStyle/>
+          <a:p>
+            <a:pPr algn="ctr"/>
+            <a:endParaRPr lang="en-US"/>
+          </a:p>
+        </p:txBody>
+      </p:sp>
+      <p:sp>
+        <p:nvSpPr>
+          <p:cNvPr id="16" name="Rectangle 15">
+            <a:extLst>
+              <a:ext uri="{FF2B5EF4-FFF2-40B4-BE49-F238E27FC236}">
+                <a16:creationId xmlns:a16="http://schemas.microsoft.com/office/drawing/2014/main" id="{3783CA14-24A1-485C-8B30-D6A5D87987AD}"/>
+              </a:ext>
+              <a:ext uri="{C183D7F6-B498-43B3-948B-1728B52AA6E4}">
+                <adec:decorative xmlns:adec="http://schemas.microsoft.com/office/drawing/2017/decorative" val="1"/>
+              </a:ext>
+            </a:extLst>
+          </p:cNvPr>
+          <p:cNvSpPr>
+            <a:spLocks noGrp="1" noRot="1" noChangeAspect="1" noMove="1" noResize="1" noEditPoints="1" noAdjustHandles="1" noChangeArrowheads="1" noChangeShapeType="1" noTextEdit="1"/>
+          </p:cNvSpPr>
+          <p:nvPr>
+            <p:extLst>
+              <p:ext uri="{386F3935-93C4-4BCD-93E2-E3B085C9AB24}">
+                <p16:designElem xmlns:p16="http://schemas.microsoft.com/office/powerpoint/2015/main" val="1"/>
+              </p:ext>
+            </p:extLst>
+          </p:nvPr>
+        </p:nvSpPr>
+        <p:spPr>
+          <a:xfrm rot="18900000" flipH="1">
+            <a:off x="10043482" y="655140"/>
+            <a:ext cx="687472" cy="687472"/>
+          </a:xfrm>
+          <a:prstGeom prst="rect">
+            <a:avLst/>
+          </a:prstGeom>
+          <a:solidFill>
+            <a:schemeClr val="accent4">
+              <a:alpha val="30000"/>
+            </a:schemeClr>
+          </a:solidFill>
+          <a:ln>
+            <a:noFill/>
+          </a:ln>
+        </p:spPr>
+        <p:style>
+          <a:lnRef idx="2">
+            <a:schemeClr val="accent1">
+              <a:shade val="50000"/>
+            </a:schemeClr>
+          </a:lnRef>
+          <a:fillRef idx="1">
+            <a:schemeClr val="accent1"/>
+          </a:fillRef>
+          <a:effectRef idx="0">
+            <a:schemeClr val="accent1"/>
+          </a:effectRef>
+          <a:fontRef idx="minor">
+            <a:schemeClr val="lt1"/>
+          </a:fontRef>
+        </p:style>
+        <p:txBody>
+          <a:bodyPr rtlCol="0" anchor="ctr"/>
+          <a:lstStyle/>
+          <a:p>
+            <a:pPr algn="ctr"/>
+            <a:endParaRPr lang="en-US"/>
+          </a:p>
+        </p:txBody>
+      </p:sp>
+      <p:sp>
+        <p:nvSpPr>
+          <p:cNvPr id="18" name="Freeform: Shape 17">
+            <a:extLst>
+              <a:ext uri="{FF2B5EF4-FFF2-40B4-BE49-F238E27FC236}">
+                <a16:creationId xmlns:a16="http://schemas.microsoft.com/office/drawing/2014/main" id="{9A97C86A-04D6-40F7-AE84-31AB43E6A846}"/>
+              </a:ext>
+              <a:ext uri="{C183D7F6-B498-43B3-948B-1728B52AA6E4}">
+                <adec:decorative xmlns:adec="http://schemas.microsoft.com/office/drawing/2017/decorative" val="1"/>
+              </a:ext>
+            </a:extLst>
+          </p:cNvPr>
+          <p:cNvSpPr>
+            <a:spLocks noGrp="1" noRot="1" noChangeAspect="1" noMove="1" noResize="1" noEditPoints="1" noAdjustHandles="1" noChangeArrowheads="1" noChangeShapeType="1" noTextEdit="1"/>
+          </p:cNvSpPr>
+          <p:nvPr>
+            <p:extLst>
+              <p:ext uri="{386F3935-93C4-4BCD-93E2-E3B085C9AB24}">
+                <p16:designElem xmlns:p16="http://schemas.microsoft.com/office/powerpoint/2015/main" val="1"/>
+              </p:ext>
+            </p:extLst>
+          </p:nvPr>
+        </p:nvSpPr>
+        <p:spPr>
+          <a:xfrm rot="10800000" flipH="1">
+            <a:off x="9356643" y="0"/>
+            <a:ext cx="2835357" cy="1480837"/>
+          </a:xfrm>
+          <a:custGeom>
+            <a:avLst/>
+            <a:gdLst>
+              <a:gd name="connsiteX0" fmla="*/ 2835357 w 2835357"/>
+              <a:gd name="connsiteY0" fmla="*/ 1480837 h 1480837"/>
+              <a:gd name="connsiteX1" fmla="*/ 0 w 2835357"/>
+              <a:gd name="connsiteY1" fmla="*/ 1480837 h 1480837"/>
+              <a:gd name="connsiteX2" fmla="*/ 1552727 w 2835357"/>
+              <a:gd name="connsiteY2" fmla="*/ 0 h 1480837"/>
+              <a:gd name="connsiteX3" fmla="*/ 2835357 w 2835357"/>
+              <a:gd name="connsiteY3" fmla="*/ 1223245 h 1480837"/>
+            </a:gdLst>
+            <a:ahLst/>
+            <a:cxnLst>
+              <a:cxn ang="0">
+                <a:pos x="connsiteX0" y="connsiteY0"/>
+              </a:cxn>
+              <a:cxn ang="0">
+                <a:pos x="connsiteX1" y="connsiteY1"/>
+              </a:cxn>
+              <a:cxn ang="0">
+                <a:pos x="connsiteX2" y="connsiteY2"/>
+              </a:cxn>
+              <a:cxn ang="0">
+                <a:pos x="connsiteX3" y="connsiteY3"/>
+              </a:cxn>
+            </a:cxnLst>
+            <a:rect l="l" t="t" r="r" b="b"/>
+            <a:pathLst>
+              <a:path w="2835357" h="1480837">
+                <a:moveTo>
+                  <a:pt x="2835357" y="1480837"/>
+                </a:moveTo>
+                <a:lnTo>
+                  <a:pt x="0" y="1480837"/>
+                </a:lnTo>
+                <a:lnTo>
+                  <a:pt x="1552727" y="0"/>
+                </a:lnTo>
+                <a:lnTo>
+                  <a:pt x="2835357" y="1223245"/>
+                </a:lnTo>
+                <a:close/>
+              </a:path>
+            </a:pathLst>
+          </a:custGeom>
+          <a:solidFill>
+            <a:schemeClr val="accent4">
+              <a:alpha val="30000"/>
+            </a:schemeClr>
+          </a:solidFill>
+          <a:ln>
+            <a:noFill/>
+          </a:ln>
+        </p:spPr>
+        <p:style>
+          <a:lnRef idx="2">
+            <a:schemeClr val="accent1">
+              <a:shade val="50000"/>
+            </a:schemeClr>
+          </a:lnRef>
+          <a:fillRef idx="1">
+            <a:schemeClr val="accent1"/>
+          </a:fillRef>
+          <a:effectRef idx="0">
+            <a:schemeClr val="accent1"/>
+          </a:effectRef>
+          <a:fontRef idx="minor">
+            <a:schemeClr val="lt1"/>
+          </a:fontRef>
+        </p:style>
+        <p:txBody>
+          <a:bodyPr wrap="square" rtlCol="0" anchor="ctr">
+            <a:noAutofit/>
+          </a:bodyPr>
+          <a:lstStyle/>
+          <a:p>
+            <a:pPr algn="ctr"/>
+            <a:endParaRPr lang="en-US" dirty="0"/>
+          </a:p>
+        </p:txBody>
+      </p:sp>
+      <p:sp>
+        <p:nvSpPr>
+          <p:cNvPr id="20" name="Isosceles Triangle 19">
+            <a:extLst>
+              <a:ext uri="{FF2B5EF4-FFF2-40B4-BE49-F238E27FC236}">
+                <a16:creationId xmlns:a16="http://schemas.microsoft.com/office/drawing/2014/main" id="{FF9F2414-84E8-453E-B1F3-389FDE8192D9}"/>
+              </a:ext>
+              <a:ext uri="{C183D7F6-B498-43B3-948B-1728B52AA6E4}">
+                <adec:decorative xmlns:adec="http://schemas.microsoft.com/office/drawing/2017/decorative" val="1"/>
+              </a:ext>
+            </a:extLst>
+          </p:cNvPr>
+          <p:cNvSpPr>
+            <a:spLocks noGrp="1" noRot="1" noChangeAspect="1" noMove="1" noResize="1" noEditPoints="1" noAdjustHandles="1" noChangeArrowheads="1" noChangeShapeType="1" noTextEdit="1"/>
+          </p:cNvSpPr>
+          <p:nvPr>
+            <p:extLst>
+              <p:ext uri="{386F3935-93C4-4BCD-93E2-E3B085C9AB24}">
+                <p16:designElem xmlns:p16="http://schemas.microsoft.com/office/powerpoint/2015/main" val="1"/>
+              </p:ext>
+            </p:extLst>
+          </p:nvPr>
+        </p:nvSpPr>
+        <p:spPr>
+          <a:xfrm flipH="1">
+            <a:off x="7976344" y="6115501"/>
+            <a:ext cx="1494513" cy="742499"/>
+          </a:xfrm>
+          <a:prstGeom prst="triangle">
+            <a:avLst/>
+          </a:prstGeom>
+          <a:solidFill>
+            <a:schemeClr val="accent1">
+              <a:alpha val="30000"/>
+            </a:schemeClr>
+          </a:solidFill>
+          <a:ln>
+            <a:noFill/>
+          </a:ln>
+        </p:spPr>
+        <p:style>
+          <a:lnRef idx="2">
+            <a:schemeClr val="accent1">
+              <a:shade val="50000"/>
+            </a:schemeClr>
+          </a:lnRef>
+          <a:fillRef idx="1">
+            <a:schemeClr val="accent1"/>
+          </a:fillRef>
+          <a:effectRef idx="0">
+            <a:schemeClr val="accent1"/>
+          </a:effectRef>
+          <a:fontRef idx="minor">
+            <a:schemeClr val="lt1"/>
+          </a:fontRef>
+        </p:style>
+        <p:txBody>
+          <a:bodyPr rtlCol="0" anchor="ctr"/>
+          <a:lstStyle/>
+          <a:p>
+            <a:pPr algn="ctr"/>
+            <a:endParaRPr lang="en-US"/>
+          </a:p>
+        </p:txBody>
+      </p:sp>
+      <p:pic>
+        <p:nvPicPr>
+          <p:cNvPr id="5" name="Picture 4">
+            <a:extLst>
+              <a:ext uri="{FF2B5EF4-FFF2-40B4-BE49-F238E27FC236}">
+                <a16:creationId xmlns:a16="http://schemas.microsoft.com/office/drawing/2014/main" id="{213B6238-D538-EB4C-89D7-3AAD5FB79508}"/>
+              </a:ext>
+            </a:extLst>
+          </p:cNvPr>
+          <p:cNvPicPr>
+            <a:picLocks noChangeAspect="1"/>
+          </p:cNvPicPr>
+          <p:nvPr/>
+        </p:nvPicPr>
+        <p:blipFill>
+          <a:blip r:embed="rId2"/>
+          <a:stretch>
+            <a:fillRect/>
+          </a:stretch>
+        </p:blipFill>
+        <p:spPr>
+          <a:xfrm>
+            <a:off x="643467" y="839045"/>
+            <a:ext cx="10905066" cy="5179908"/>
+          </a:xfrm>
+          <a:prstGeom prst="rect">
+            <a:avLst/>
+          </a:prstGeom>
+          <a:ln>
+            <a:noFill/>
+          </a:ln>
+        </p:spPr>
+      </p:pic>
+      <p:sp>
+        <p:nvSpPr>
+          <p:cNvPr id="22" name="Isosceles Triangle 21">
+            <a:extLst>
+              <a:ext uri="{FF2B5EF4-FFF2-40B4-BE49-F238E27FC236}">
+                <a16:creationId xmlns:a16="http://schemas.microsoft.com/office/drawing/2014/main" id="{3ECA69A1-7536-43AC-85EF-C7106179F5ED}"/>
+              </a:ext>
+              <a:ext uri="{C183D7F6-B498-43B3-948B-1728B52AA6E4}">
+                <adec:decorative xmlns:adec="http://schemas.microsoft.com/office/drawing/2017/decorative" val="1"/>
+              </a:ext>
+            </a:extLst>
+          </p:cNvPr>
+          <p:cNvSpPr>
+            <a:spLocks noGrp="1" noRot="1" noChangeAspect="1" noMove="1" noResize="1" noEditPoints="1" noAdjustHandles="1" noChangeArrowheads="1" noChangeShapeType="1" noTextEdit="1"/>
+          </p:cNvSpPr>
+          <p:nvPr>
+            <p:extLst>
+              <p:ext uri="{386F3935-93C4-4BCD-93E2-E3B085C9AB24}">
+                <p16:designElem xmlns:p16="http://schemas.microsoft.com/office/powerpoint/2015/main" val="1"/>
+              </p:ext>
+            </p:extLst>
+          </p:nvPr>
+        </p:nvSpPr>
+        <p:spPr>
+          <a:xfrm flipH="1">
+            <a:off x="7604080" y="6453143"/>
+            <a:ext cx="814903" cy="404857"/>
+          </a:xfrm>
+          <a:prstGeom prst="triangle">
+            <a:avLst/>
+          </a:prstGeom>
+          <a:solidFill>
+            <a:schemeClr val="accent1">
+              <a:alpha val="30000"/>
+            </a:schemeClr>
+          </a:solidFill>
+          <a:ln>
+            <a:noFill/>
+          </a:ln>
+        </p:spPr>
+        <p:style>
+          <a:lnRef idx="2">
+            <a:schemeClr val="accent1">
+              <a:shade val="50000"/>
+            </a:schemeClr>
+          </a:lnRef>
+          <a:fillRef idx="1">
+            <a:schemeClr val="accent1"/>
+          </a:fillRef>
+          <a:effectRef idx="0">
+            <a:schemeClr val="accent1"/>
+          </a:effectRef>
+          <a:fontRef idx="minor">
+            <a:schemeClr val="lt1"/>
+          </a:fontRef>
+        </p:style>
+        <p:txBody>
+          <a:bodyPr rtlCol="0" anchor="ctr"/>
+          <a:lstStyle/>
+          <a:p>
+            <a:pPr algn="ctr"/>
+            <a:endParaRPr lang="en-US"/>
+          </a:p>
+        </p:txBody>
+      </p:sp>
+    </p:spTree>
+    <p:extLst>
+      <p:ext uri="{BB962C8B-B14F-4D97-AF65-F5344CB8AC3E}">
         <p14:creationId xmlns:p14="http://schemas.microsoft.com/office/powerpoint/2010/main" val="2042024187"/>
       </p:ext>
     </p:extLst>
@@ -6563,7 +7341,7 @@
 </p:sld>
 </file>
 
-<file path=ppt/slides/slide6.xml><?xml version="1.0" encoding="utf-8"?>
+<file path=ppt/slides/slide7.xml><?xml version="1.0" encoding="utf-8"?>
 <p:sld xmlns:a="http://schemas.openxmlformats.org/drawingml/2006/main" xmlns:r="http://schemas.openxmlformats.org/officeDocument/2006/relationships" xmlns:p="http://schemas.openxmlformats.org/presentationml/2006/main">
   <p:cSld>
     <p:bg>

</xml_diff>

<commit_message>
fixed run all tests
</commit_message>
<xml_diff>
--- a/Automated Testing Refinement Proposal.pptx
+++ b/Automated Testing Refinement Proposal.pptx
@@ -471,6 +471,90 @@
 </file>
 
 <file path=ppt/notesSlides/notesSlide1.xml><?xml version="1.0" encoding="utf-8"?>
+<p:notes xmlns:a="http://schemas.openxmlformats.org/drawingml/2006/main" xmlns:r="http://schemas.openxmlformats.org/officeDocument/2006/relationships" xmlns:p="http://schemas.openxmlformats.org/presentationml/2006/main">
+  <p:cSld>
+    <p:spTree>
+      <p:nvGrpSpPr>
+        <p:cNvPr id="1" name=""/>
+        <p:cNvGrpSpPr/>
+        <p:nvPr/>
+      </p:nvGrpSpPr>
+      <p:grpSpPr>
+        <a:xfrm>
+          <a:off x="0" y="0"/>
+          <a:ext cx="0" cy="0"/>
+          <a:chOff x="0" y="0"/>
+          <a:chExt cx="0" cy="0"/>
+        </a:xfrm>
+      </p:grpSpPr>
+      <p:sp>
+        <p:nvSpPr>
+          <p:cNvPr id="2" name="Slide Image Placeholder 1"/>
+          <p:cNvSpPr>
+            <a:spLocks noGrp="1" noRot="1" noChangeAspect="1"/>
+          </p:cNvSpPr>
+          <p:nvPr>
+            <p:ph type="sldImg"/>
+          </p:nvPr>
+        </p:nvSpPr>
+        <p:spPr/>
+      </p:sp>
+      <p:sp>
+        <p:nvSpPr>
+          <p:cNvPr id="3" name="Notes Placeholder 2"/>
+          <p:cNvSpPr>
+            <a:spLocks noGrp="1"/>
+          </p:cNvSpPr>
+          <p:nvPr>
+            <p:ph type="body" idx="1"/>
+          </p:nvPr>
+        </p:nvSpPr>
+        <p:spPr/>
+        <p:txBody>
+          <a:bodyPr/>
+          <a:lstStyle/>
+          <a:p>
+            <a:endParaRPr lang="en-US" dirty="0"/>
+          </a:p>
+        </p:txBody>
+      </p:sp>
+      <p:sp>
+        <p:nvSpPr>
+          <p:cNvPr id="4" name="Slide Number Placeholder 3"/>
+          <p:cNvSpPr>
+            <a:spLocks noGrp="1"/>
+          </p:cNvSpPr>
+          <p:nvPr>
+            <p:ph type="sldNum" sz="quarter" idx="5"/>
+          </p:nvPr>
+        </p:nvSpPr>
+        <p:spPr/>
+        <p:txBody>
+          <a:bodyPr/>
+          <a:lstStyle/>
+          <a:p>
+            <a:fld id="{A0E9F198-3222-4179-AA1E-E221065A465D}" type="slidenum">
+              <a:rPr lang="en-US" smtClean="0"/>
+              <a:t>2</a:t>
+            </a:fld>
+            <a:endParaRPr lang="en-US"/>
+          </a:p>
+        </p:txBody>
+      </p:sp>
+    </p:spTree>
+    <p:extLst>
+      <p:ext uri="{BB962C8B-B14F-4D97-AF65-F5344CB8AC3E}">
+        <p14:creationId xmlns:p14="http://schemas.microsoft.com/office/powerpoint/2010/main" val="2701615595"/>
+      </p:ext>
+    </p:extLst>
+  </p:cSld>
+  <p:clrMapOvr>
+    <a:masterClrMapping/>
+  </p:clrMapOvr>
+</p:notes>
+</file>
+
+<file path=ppt/notesSlides/notesSlide2.xml><?xml version="1.0" encoding="utf-8"?>
 <p:notes xmlns:a="http://schemas.openxmlformats.org/drawingml/2006/main" xmlns:r="http://schemas.openxmlformats.org/officeDocument/2006/relationships" xmlns:p="http://schemas.openxmlformats.org/presentationml/2006/main">
   <p:cSld>
     <p:spTree>
@@ -4538,7 +4622,7 @@
           <p:nvPr/>
         </p:nvPicPr>
         <p:blipFill>
-          <a:blip r:embed="rId2"/>
+          <a:blip r:embed="rId3"/>
           <a:srcRect l="359" r="1" b="1"/>
           <a:stretch>
             <a:fillRect/>
@@ -4637,36 +4721,6 @@
           <p:nvPr/>
         </p:nvPicPr>
         <p:blipFill>
-          <a:blip r:embed="rId2"/>
-          <a:stretch>
-            <a:fillRect/>
-          </a:stretch>
-        </p:blipFill>
-        <p:spPr>
-          <a:xfrm>
-            <a:off x="0" y="321568"/>
-            <a:ext cx="12192000" cy="6214864"/>
-          </a:xfrm>
-          <a:prstGeom prst="rect">
-            <a:avLst/>
-          </a:prstGeom>
-        </p:spPr>
-      </p:pic>
-      <p:pic>
-        <p:nvPicPr>
-          <p:cNvPr id="11" name="Picture 10">
-            <a:extLst>
-              <a:ext uri="{FF2B5EF4-FFF2-40B4-BE49-F238E27FC236}">
-                <a16:creationId xmlns:a16="http://schemas.microsoft.com/office/drawing/2014/main" id="{0979E056-51E9-BEE0-227D-AC2026944413}"/>
-              </a:ext>
-            </a:extLst>
-          </p:cNvPr>
-          <p:cNvPicPr>
-            <a:picLocks noChangeAspect="1"/>
-          </p:cNvPicPr>
-          <p:nvPr/>
-        </p:nvPicPr>
-        <p:blipFill>
           <a:blip r:embed="rId3"/>
           <a:stretch>
             <a:fillRect/>
@@ -4674,8 +4728,8 @@
         </p:blipFill>
         <p:spPr>
           <a:xfrm>
-            <a:off x="0" y="353193"/>
-            <a:ext cx="12192000" cy="6151613"/>
+            <a:off x="0" y="321568"/>
+            <a:ext cx="12192000" cy="6214864"/>
           </a:xfrm>
           <a:prstGeom prst="rect">
             <a:avLst/>
@@ -4684,10 +4738,10 @@
       </p:pic>
       <p:pic>
         <p:nvPicPr>
-          <p:cNvPr id="3" name="Picture 2">
-            <a:extLst>
-              <a:ext uri="{FF2B5EF4-FFF2-40B4-BE49-F238E27FC236}">
-                <a16:creationId xmlns:a16="http://schemas.microsoft.com/office/drawing/2014/main" id="{CE478AD2-C4E7-BDB9-BB00-D72BEDE5D4F3}"/>
+          <p:cNvPr id="11" name="Picture 10">
+            <a:extLst>
+              <a:ext uri="{FF2B5EF4-FFF2-40B4-BE49-F238E27FC236}">
+                <a16:creationId xmlns:a16="http://schemas.microsoft.com/office/drawing/2014/main" id="{0979E056-51E9-BEE0-227D-AC2026944413}"/>
               </a:ext>
             </a:extLst>
           </p:cNvPr>
@@ -4704,8 +4758,68 @@
         </p:blipFill>
         <p:spPr>
           <a:xfrm>
+            <a:off x="0" y="353193"/>
+            <a:ext cx="12192000" cy="6151613"/>
+          </a:xfrm>
+          <a:prstGeom prst="rect">
+            <a:avLst/>
+          </a:prstGeom>
+        </p:spPr>
+      </p:pic>
+      <p:pic>
+        <p:nvPicPr>
+          <p:cNvPr id="3" name="Picture 2">
+            <a:extLst>
+              <a:ext uri="{FF2B5EF4-FFF2-40B4-BE49-F238E27FC236}">
+                <a16:creationId xmlns:a16="http://schemas.microsoft.com/office/drawing/2014/main" id="{CE478AD2-C4E7-BDB9-BB00-D72BEDE5D4F3}"/>
+              </a:ext>
+            </a:extLst>
+          </p:cNvPr>
+          <p:cNvPicPr>
+            <a:picLocks noChangeAspect="1"/>
+          </p:cNvPicPr>
+          <p:nvPr/>
+        </p:nvPicPr>
+        <p:blipFill>
+          <a:blip r:embed="rId5"/>
+          <a:stretch>
+            <a:fillRect/>
+          </a:stretch>
+        </p:blipFill>
+        <p:spPr>
+          <a:xfrm>
             <a:off x="0" y="314412"/>
             <a:ext cx="12192000" cy="6229175"/>
+          </a:xfrm>
+          <a:prstGeom prst="rect">
+            <a:avLst/>
+          </a:prstGeom>
+        </p:spPr>
+      </p:pic>
+      <p:pic>
+        <p:nvPicPr>
+          <p:cNvPr id="4" name="Picture 3">
+            <a:extLst>
+              <a:ext uri="{FF2B5EF4-FFF2-40B4-BE49-F238E27FC236}">
+                <a16:creationId xmlns:a16="http://schemas.microsoft.com/office/drawing/2014/main" id="{80F02AAB-3EA2-98A8-E685-86EE39BA7AB2}"/>
+              </a:ext>
+            </a:extLst>
+          </p:cNvPr>
+          <p:cNvPicPr>
+            <a:picLocks noChangeAspect="1"/>
+          </p:cNvPicPr>
+          <p:nvPr/>
+        </p:nvPicPr>
+        <p:blipFill>
+          <a:blip r:embed="rId6"/>
+          <a:stretch>
+            <a:fillRect/>
+          </a:stretch>
+        </p:blipFill>
+        <p:spPr>
+          <a:xfrm>
+            <a:off x="0" y="327376"/>
+            <a:ext cx="12192000" cy="6203248"/>
           </a:xfrm>
           <a:prstGeom prst="rect">
             <a:avLst/>

</xml_diff>